<commit_message>
updated model selection program and presentation
</commit_message>
<xml_diff>
--- a/presentations/EDA.pptx
+++ b/presentations/EDA.pptx
@@ -5,12 +5,10 @@
     <p:sldMasterId id="2147483648" r:id="rId1"/>
   </p:sldMasterIdLst>
   <p:sldIdLst>
-    <p:sldId id="256" r:id="rId2"/>
-    <p:sldId id="257" r:id="rId3"/>
-    <p:sldId id="262" r:id="rId4"/>
-    <p:sldId id="259" r:id="rId5"/>
-    <p:sldId id="261" r:id="rId6"/>
-    <p:sldId id="258" r:id="rId7"/>
+    <p:sldId id="259" r:id="rId2"/>
+    <p:sldId id="260" r:id="rId3"/>
+    <p:sldId id="261" r:id="rId4"/>
+    <p:sldId id="262" r:id="rId5"/>
   </p:sldIdLst>
   <p:sldSz cx="12192000" cy="6858000"/>
   <p:notesSz cx="6858000" cy="9144000"/>
@@ -109,6 +107,11 @@
       </a:defRPr>
     </a:lvl9pPr>
   </p:defaultTextStyle>
+  <p:extLst>
+    <p:ext uri="{EFAFB233-063F-42B5-8137-9DF3F51BA10A}">
+      <p15:sldGuideLst xmlns:p15="http://schemas.microsoft.com/office/powerpoint/2012/main"/>
+    </p:ext>
+  </p:extLst>
 </p:presentation>
 </file>
 
@@ -261,7 +264,7 @@
           <a:p>
             <a:fld id="{4840D3AB-2071-FC49-86FE-06FB305117BA}" type="datetimeFigureOut">
               <a:rPr lang="it-IT" smtClean="0"/>
-              <a:t>15/11/20</a:t>
+              <a:t>07/12/20</a:t>
             </a:fld>
             <a:endParaRPr lang="it-IT"/>
           </a:p>
@@ -461,7 +464,7 @@
           <a:p>
             <a:fld id="{4840D3AB-2071-FC49-86FE-06FB305117BA}" type="datetimeFigureOut">
               <a:rPr lang="it-IT" smtClean="0"/>
-              <a:t>15/11/20</a:t>
+              <a:t>07/12/20</a:t>
             </a:fld>
             <a:endParaRPr lang="it-IT"/>
           </a:p>
@@ -671,7 +674,7 @@
           <a:p>
             <a:fld id="{4840D3AB-2071-FC49-86FE-06FB305117BA}" type="datetimeFigureOut">
               <a:rPr lang="it-IT" smtClean="0"/>
-              <a:t>15/11/20</a:t>
+              <a:t>07/12/20</a:t>
             </a:fld>
             <a:endParaRPr lang="it-IT"/>
           </a:p>
@@ -871,7 +874,7 @@
           <a:p>
             <a:fld id="{4840D3AB-2071-FC49-86FE-06FB305117BA}" type="datetimeFigureOut">
               <a:rPr lang="it-IT" smtClean="0"/>
-              <a:t>15/11/20</a:t>
+              <a:t>07/12/20</a:t>
             </a:fld>
             <a:endParaRPr lang="it-IT"/>
           </a:p>
@@ -1147,7 +1150,7 @@
           <a:p>
             <a:fld id="{4840D3AB-2071-FC49-86FE-06FB305117BA}" type="datetimeFigureOut">
               <a:rPr lang="it-IT" smtClean="0"/>
-              <a:t>15/11/20</a:t>
+              <a:t>07/12/20</a:t>
             </a:fld>
             <a:endParaRPr lang="it-IT"/>
           </a:p>
@@ -1415,7 +1418,7 @@
           <a:p>
             <a:fld id="{4840D3AB-2071-FC49-86FE-06FB305117BA}" type="datetimeFigureOut">
               <a:rPr lang="it-IT" smtClean="0"/>
-              <a:t>15/11/20</a:t>
+              <a:t>07/12/20</a:t>
             </a:fld>
             <a:endParaRPr lang="it-IT"/>
           </a:p>
@@ -1830,7 +1833,7 @@
           <a:p>
             <a:fld id="{4840D3AB-2071-FC49-86FE-06FB305117BA}" type="datetimeFigureOut">
               <a:rPr lang="it-IT" smtClean="0"/>
-              <a:t>15/11/20</a:t>
+              <a:t>07/12/20</a:t>
             </a:fld>
             <a:endParaRPr lang="it-IT"/>
           </a:p>
@@ -1972,7 +1975,7 @@
           <a:p>
             <a:fld id="{4840D3AB-2071-FC49-86FE-06FB305117BA}" type="datetimeFigureOut">
               <a:rPr lang="it-IT" smtClean="0"/>
-              <a:t>15/11/20</a:t>
+              <a:t>07/12/20</a:t>
             </a:fld>
             <a:endParaRPr lang="it-IT"/>
           </a:p>
@@ -2085,7 +2088,7 @@
           <a:p>
             <a:fld id="{4840D3AB-2071-FC49-86FE-06FB305117BA}" type="datetimeFigureOut">
               <a:rPr lang="it-IT" smtClean="0"/>
-              <a:t>15/11/20</a:t>
+              <a:t>07/12/20</a:t>
             </a:fld>
             <a:endParaRPr lang="it-IT"/>
           </a:p>
@@ -2398,7 +2401,7 @@
           <a:p>
             <a:fld id="{4840D3AB-2071-FC49-86FE-06FB305117BA}" type="datetimeFigureOut">
               <a:rPr lang="it-IT" smtClean="0"/>
-              <a:t>15/11/20</a:t>
+              <a:t>07/12/20</a:t>
             </a:fld>
             <a:endParaRPr lang="it-IT"/>
           </a:p>
@@ -2687,7 +2690,7 @@
           <a:p>
             <a:fld id="{4840D3AB-2071-FC49-86FE-06FB305117BA}" type="datetimeFigureOut">
               <a:rPr lang="it-IT" smtClean="0"/>
-              <a:t>15/11/20</a:t>
+              <a:t>07/12/20</a:t>
             </a:fld>
             <a:endParaRPr lang="it-IT"/>
           </a:p>
@@ -2930,7 +2933,7 @@
           <a:p>
             <a:fld id="{4840D3AB-2071-FC49-86FE-06FB305117BA}" type="datetimeFigureOut">
               <a:rPr lang="it-IT" smtClean="0"/>
-              <a:t>15/11/20</a:t>
+              <a:t>07/12/20</a:t>
             </a:fld>
             <a:endParaRPr lang="it-IT"/>
           </a:p>
@@ -3333,14 +3336,6 @@
 <file path=ppt/slides/slide1.xml><?xml version="1.0" encoding="utf-8"?>
 <p:sld xmlns:a="http://schemas.openxmlformats.org/drawingml/2006/main" xmlns:r="http://schemas.openxmlformats.org/officeDocument/2006/relationships" xmlns:p="http://schemas.openxmlformats.org/presentationml/2006/main">
   <p:cSld>
-    <p:bg>
-      <p:bgPr>
-        <a:solidFill>
-          <a:schemeClr val="bg1"/>
-        </a:solidFill>
-        <a:effectLst/>
-      </p:bgPr>
-    </p:bg>
     <p:spTree>
       <p:nvGrpSpPr>
         <p:cNvPr id="1" name=""/>
@@ -3357,76 +3352,10 @@
       </p:grpSpPr>
       <p:sp>
         <p:nvSpPr>
-          <p:cNvPr id="30" name="Rectangle 29">
-            <a:extLst>
-              <a:ext uri="{FF2B5EF4-FFF2-40B4-BE49-F238E27FC236}">
-                <a16:creationId xmlns:a16="http://schemas.microsoft.com/office/drawing/2014/main" id="{3EDD119B-6BFA-4C3F-90CE-97DAFD604ECC}"/>
-              </a:ext>
-              <a:ext uri="{C183D7F6-B498-43B3-948B-1728B52AA6E4}">
-                <adec:decorative xmlns:adec="http://schemas.microsoft.com/office/drawing/2017/decorative" val="1"/>
-              </a:ext>
-            </a:extLst>
-          </p:cNvPr>
-          <p:cNvSpPr>
-            <a:spLocks noGrp="1" noRot="1" noChangeAspect="1" noMove="1" noResize="1" noEditPoints="1" noAdjustHandles="1" noChangeArrowheads="1" noChangeShapeType="1" noTextEdit="1"/>
-          </p:cNvSpPr>
-          <p:nvPr>
-            <p:extLst>
-              <p:ext uri="{386F3935-93C4-4BCD-93E2-E3B085C9AB24}">
-                <p16:designElem xmlns:p16="http://schemas.microsoft.com/office/powerpoint/2015/main" val="1"/>
-              </p:ext>
-            </p:extLst>
-          </p:nvPr>
-        </p:nvSpPr>
-        <p:spPr bwMode="ltGray">
-          <a:xfrm>
-            <a:off x="321564" y="320040"/>
-            <a:ext cx="11548872" cy="6217920"/>
-          </a:xfrm>
-          <a:prstGeom prst="rect">
-            <a:avLst/>
-          </a:prstGeom>
-          <a:solidFill>
-            <a:schemeClr val="tx1">
-              <a:lumMod val="75000"/>
-              <a:lumOff val="25000"/>
-            </a:schemeClr>
-          </a:solidFill>
-          <a:ln w="127000" cap="sq" cmpd="thinThick">
-            <a:noFill/>
-          </a:ln>
-        </p:spPr>
-        <p:style>
-          <a:lnRef idx="2">
-            <a:schemeClr val="accent1">
-              <a:shade val="50000"/>
-            </a:schemeClr>
-          </a:lnRef>
-          <a:fillRef idx="1">
-            <a:schemeClr val="accent1"/>
-          </a:fillRef>
-          <a:effectRef idx="0">
-            <a:schemeClr val="accent1"/>
-          </a:effectRef>
-          <a:fontRef idx="minor">
-            <a:schemeClr val="lt1"/>
-          </a:fontRef>
-        </p:style>
-        <p:txBody>
-          <a:bodyPr rtlCol="0" anchor="ctr"/>
-          <a:lstStyle/>
-          <a:p>
-            <a:pPr algn="ctr"/>
-            <a:endParaRPr lang="en-US"/>
-          </a:p>
-        </p:txBody>
-      </p:sp>
-      <p:sp>
-        <p:nvSpPr>
           <p:cNvPr id="2" name="Title 1">
             <a:extLst>
               <a:ext uri="{FF2B5EF4-FFF2-40B4-BE49-F238E27FC236}">
-                <a16:creationId xmlns:a16="http://schemas.microsoft.com/office/drawing/2014/main" id="{912C9387-8F42-FA44-8146-9A4442348F45}"/>
+                <a16:creationId xmlns:a16="http://schemas.microsoft.com/office/drawing/2014/main" id="{FD2E6F3D-9E78-1641-BCA0-37EADF31B8B4}"/>
               </a:ext>
             </a:extLst>
           </p:cNvPr>
@@ -3437,27 +3366,28 @@
             <p:ph type="ctrTitle"/>
           </p:nvPr>
         </p:nvSpPr>
-        <p:spPr>
-          <a:xfrm>
-            <a:off x="4380588" y="965199"/>
-            <a:ext cx="6766078" cy="4927601"/>
-          </a:xfrm>
-        </p:spPr>
-        <p:txBody>
-          <a:bodyPr anchor="ctr">
-            <a:normAutofit/>
-          </a:bodyPr>
-          <a:lstStyle/>
-          <a:p>
-            <a:pPr algn="l"/>
-            <a:r>
-              <a:rPr lang="it-IT" sz="4800">
-                <a:solidFill>
-                  <a:schemeClr val="bg1"/>
-                </a:solidFill>
-              </a:rPr>
+        <p:spPr/>
+        <p:txBody>
+          <a:bodyPr/>
+          <a:lstStyle/>
+          <a:p>
+            <a:r>
+              <a:rPr lang="it-IT" dirty="0"/>
               <a:t>AAVAIL </a:t>
             </a:r>
+            <a:r>
+              <a:rPr lang="it-IT" dirty="0" err="1"/>
+              <a:t>revenue</a:t>
+            </a:r>
+            <a:r>
+              <a:rPr lang="it-IT" dirty="0"/>
+              <a:t> </a:t>
+            </a:r>
+            <a:r>
+              <a:rPr lang="it-IT" dirty="0" err="1"/>
+              <a:t>predictor</a:t>
+            </a:r>
+            <a:endParaRPr lang="it-IT" dirty="0"/>
           </a:p>
         </p:txBody>
       </p:sp>
@@ -3466,7 +3396,7 @@
           <p:cNvPr id="3" name="Subtitle 2">
             <a:extLst>
               <a:ext uri="{FF2B5EF4-FFF2-40B4-BE49-F238E27FC236}">
-                <a16:creationId xmlns:a16="http://schemas.microsoft.com/office/drawing/2014/main" id="{F5B80315-9815-244D-9257-7D93B8809DD1}"/>
+                <a16:creationId xmlns:a16="http://schemas.microsoft.com/office/drawing/2014/main" id="{5FBF76CE-3D0F-A341-B2A4-89F23781C196}"/>
               </a:ext>
             </a:extLst>
           </p:cNvPr>
@@ -3477,86 +3407,26 @@
             <p:ph type="subTitle" idx="1"/>
           </p:nvPr>
         </p:nvSpPr>
-        <p:spPr>
-          <a:xfrm>
-            <a:off x="1023257" y="965198"/>
-            <a:ext cx="2707937" cy="4927602"/>
-          </a:xfrm>
-        </p:spPr>
-        <p:txBody>
-          <a:bodyPr anchor="ctr">
-            <a:normAutofit/>
-          </a:bodyPr>
-          <a:lstStyle/>
-          <a:p>
-            <a:pPr algn="r"/>
-            <a:r>
-              <a:rPr lang="en-US" sz="2000">
-                <a:solidFill>
-                  <a:srgbClr val="FFC000"/>
-                </a:solidFill>
-              </a:rPr>
-              <a:t>Analysis of Pay per View Data</a:t>
-            </a:r>
-          </a:p>
-        </p:txBody>
-      </p:sp>
-      <p:cxnSp>
-        <p:nvCxnSpPr>
-          <p:cNvPr id="32" name="Straight Connector 31">
-            <a:extLst>
-              <a:ext uri="{FF2B5EF4-FFF2-40B4-BE49-F238E27FC236}">
-                <a16:creationId xmlns:a16="http://schemas.microsoft.com/office/drawing/2014/main" id="{DC1572D0-F0FD-4D84-8F82-DC59140EB9BB}"/>
-              </a:ext>
-              <a:ext uri="{C183D7F6-B498-43B3-948B-1728B52AA6E4}">
-                <adec:decorative xmlns:adec="http://schemas.microsoft.com/office/drawing/2017/decorative" val="1"/>
-              </a:ext>
-            </a:extLst>
-          </p:cNvPr>
-          <p:cNvCxnSpPr>
-            <a:cxnSpLocks noGrp="1" noRot="1" noChangeAspect="1" noMove="1" noResize="1" noEditPoints="1" noAdjustHandles="1" noChangeArrowheads="1" noChangeShapeType="1"/>
-          </p:cNvCxnSpPr>
-          <p:nvPr>
-            <p:extLst>
-              <p:ext uri="{386F3935-93C4-4BCD-93E2-E3B085C9AB24}">
-                <p16:designElem xmlns:p16="http://schemas.microsoft.com/office/powerpoint/2015/main" val="1"/>
-              </p:ext>
-            </p:extLst>
-          </p:nvPr>
-        </p:nvCxnSpPr>
-        <p:spPr>
-          <a:xfrm>
-            <a:off x="4055891" y="2057399"/>
-            <a:ext cx="0" cy="2743200"/>
-          </a:xfrm>
-          <a:prstGeom prst="line">
-            <a:avLst/>
-          </a:prstGeom>
-          <a:ln w="19050">
-            <a:solidFill>
-              <a:schemeClr val="bg1"/>
-            </a:solidFill>
-          </a:ln>
-        </p:spPr>
-        <p:style>
-          <a:lnRef idx="1">
-            <a:schemeClr val="accent1"/>
-          </a:lnRef>
-          <a:fillRef idx="0">
-            <a:schemeClr val="accent1"/>
-          </a:fillRef>
-          <a:effectRef idx="0">
-            <a:schemeClr val="accent1"/>
-          </a:effectRef>
-          <a:fontRef idx="minor">
-            <a:schemeClr val="tx1"/>
-          </a:fontRef>
-        </p:style>
-      </p:cxnSp>
+        <p:spPr/>
+        <p:txBody>
+          <a:bodyPr/>
+          <a:lstStyle/>
+          <a:p>
+            <a:r>
+              <a:rPr lang="it-IT" dirty="0" err="1"/>
+              <a:t>Exploratory</a:t>
+            </a:r>
+            <a:r>
+              <a:rPr lang="it-IT" dirty="0"/>
+              <a:t> Data Analysis</a:t>
+            </a:r>
+          </a:p>
+        </p:txBody>
+      </p:sp>
     </p:spTree>
     <p:extLst>
       <p:ext uri="{BB962C8B-B14F-4D97-AF65-F5344CB8AC3E}">
-        <p14:creationId xmlns:p14="http://schemas.microsoft.com/office/powerpoint/2010/main" val="3850194907"/>
+        <p14:creationId xmlns:p14="http://schemas.microsoft.com/office/powerpoint/2010/main" val="21541555"/>
       </p:ext>
     </p:extLst>
   </p:cSld>
@@ -3569,17 +3439,6 @@
 <file path=ppt/slides/slide2.xml><?xml version="1.0" encoding="utf-8"?>
 <p:sld xmlns:a="http://schemas.openxmlformats.org/drawingml/2006/main" xmlns:r="http://schemas.openxmlformats.org/officeDocument/2006/relationships" xmlns:p="http://schemas.openxmlformats.org/presentationml/2006/main">
   <p:cSld>
-    <p:bg>
-      <p:bgPr>
-        <a:solidFill>
-          <a:schemeClr val="bg1">
-            <a:tint val="95000"/>
-            <a:satMod val="170000"/>
-          </a:schemeClr>
-        </a:solidFill>
-        <a:effectLst/>
-      </p:bgPr>
-    </p:bg>
     <p:spTree>
       <p:nvGrpSpPr>
         <p:cNvPr id="1" name=""/>
@@ -3594,212 +3453,231 @@
           <a:chExt cx="0" cy="0"/>
         </a:xfrm>
       </p:grpSpPr>
-      <p:sp useBgFill="1">
-        <p:nvSpPr>
-          <p:cNvPr id="8" name="Rectangle 7">
-            <a:extLst>
-              <a:ext uri="{FF2B5EF4-FFF2-40B4-BE49-F238E27FC236}">
-                <a16:creationId xmlns:a16="http://schemas.microsoft.com/office/drawing/2014/main" id="{AD72D4D1-076F-49D3-9889-EFC4F6D7CA66}"/>
-              </a:ext>
-              <a:ext uri="{C183D7F6-B498-43B3-948B-1728B52AA6E4}">
-                <adec:decorative xmlns:adec="http://schemas.microsoft.com/office/drawing/2017/decorative" val="1"/>
-              </a:ext>
-            </a:extLst>
-          </p:cNvPr>
-          <p:cNvSpPr>
-            <a:spLocks noGrp="1" noRot="1" noChangeAspect="1" noMove="1" noResize="1" noEditPoints="1" noAdjustHandles="1" noChangeArrowheads="1" noChangeShapeType="1" noTextEdit="1"/>
-          </p:cNvSpPr>
-          <p:nvPr>
-            <p:extLst>
-              <p:ext uri="{386F3935-93C4-4BCD-93E2-E3B085C9AB24}">
-                <p16:designElem xmlns:p16="http://schemas.microsoft.com/office/powerpoint/2015/main" val="1"/>
-              </p:ext>
-            </p:extLst>
-          </p:nvPr>
-        </p:nvSpPr>
+      <p:pic>
+        <p:nvPicPr>
+          <p:cNvPr id="3" name="Picture 2" descr="Chart, histogram&#10;&#10;Description automatically generated">
+            <a:extLst>
+              <a:ext uri="{FF2B5EF4-FFF2-40B4-BE49-F238E27FC236}">
+                <a16:creationId xmlns:a16="http://schemas.microsoft.com/office/drawing/2014/main" id="{B8B4278B-1F92-3244-B1EE-A55065141C64}"/>
+              </a:ext>
+            </a:extLst>
+          </p:cNvPr>
+          <p:cNvPicPr>
+            <a:picLocks noChangeAspect="1"/>
+          </p:cNvPicPr>
+          <p:nvPr/>
+        </p:nvPicPr>
+        <p:blipFill>
+          <a:blip r:embed="rId2"/>
+          <a:stretch>
+            <a:fillRect/>
+          </a:stretch>
+        </p:blipFill>
         <p:spPr>
           <a:xfrm>
-            <a:off x="0" y="0"/>
-            <a:ext cx="12188952" cy="6858000"/>
+            <a:off x="3917091" y="1482124"/>
+            <a:ext cx="8063814" cy="5375876"/>
           </a:xfrm>
           <a:prstGeom prst="rect">
             <a:avLst/>
           </a:prstGeom>
-          <a:ln>
-            <a:noFill/>
-          </a:ln>
         </p:spPr>
-        <p:style>
-          <a:lnRef idx="2">
-            <a:schemeClr val="accent1">
-              <a:shade val="50000"/>
-            </a:schemeClr>
-          </a:lnRef>
-          <a:fillRef idx="1">
-            <a:schemeClr val="accent1"/>
-          </a:fillRef>
-          <a:effectRef idx="0">
-            <a:schemeClr val="accent1"/>
-          </a:effectRef>
-          <a:fontRef idx="minor">
-            <a:schemeClr val="lt1"/>
-          </a:fontRef>
-        </p:style>
-        <p:txBody>
-          <a:bodyPr rtlCol="0" anchor="ctr"/>
-          <a:lstStyle/>
-          <a:p>
-            <a:pPr algn="ctr"/>
-            <a:endParaRPr lang="en-US"/>
-          </a:p>
-        </p:txBody>
-      </p:sp>
-      <p:sp>
-        <p:nvSpPr>
-          <p:cNvPr id="2" name="Title 1">
-            <a:extLst>
-              <a:ext uri="{FF2B5EF4-FFF2-40B4-BE49-F238E27FC236}">
-                <a16:creationId xmlns:a16="http://schemas.microsoft.com/office/drawing/2014/main" id="{F184F7D7-BA6D-8F48-91CA-FB911FF94E72}"/>
-              </a:ext>
-            </a:extLst>
-          </p:cNvPr>
-          <p:cNvSpPr>
-            <a:spLocks noGrp="1"/>
-          </p:cNvSpPr>
-          <p:nvPr>
-            <p:ph type="title"/>
-          </p:nvPr>
+      </p:pic>
+      <p:sp>
+        <p:nvSpPr>
+          <p:cNvPr id="4" name="TextBox 3">
+            <a:extLst>
+              <a:ext uri="{FF2B5EF4-FFF2-40B4-BE49-F238E27FC236}">
+                <a16:creationId xmlns:a16="http://schemas.microsoft.com/office/drawing/2014/main" id="{CB45B4F1-48F7-5B44-ABB2-944B10BF6CB7}"/>
+              </a:ext>
+            </a:extLst>
+          </p:cNvPr>
+          <p:cNvSpPr txBox="1"/>
+          <p:nvPr/>
         </p:nvSpPr>
         <p:spPr>
           <a:xfrm>
-            <a:off x="838200" y="963877"/>
-            <a:ext cx="3494362" cy="4930246"/>
+            <a:off x="444843" y="308919"/>
+            <a:ext cx="3768811" cy="1200329"/>
           </a:xfrm>
-        </p:spPr>
-        <p:txBody>
-          <a:bodyPr>
-            <a:normAutofit/>
-          </a:bodyPr>
-          <a:lstStyle/>
-          <a:p>
-            <a:pPr algn="r"/>
-            <a:r>
-              <a:rPr lang="en-US" dirty="0"/>
-              <a:t>Table of contents</a:t>
-            </a:r>
-          </a:p>
-        </p:txBody>
-      </p:sp>
-      <p:cxnSp>
-        <p:nvCxnSpPr>
-          <p:cNvPr id="10" name="Straight Connector 9">
-            <a:extLst>
-              <a:ext uri="{FF2B5EF4-FFF2-40B4-BE49-F238E27FC236}">
-                <a16:creationId xmlns:a16="http://schemas.microsoft.com/office/drawing/2014/main" id="{2D72A2C9-F3CA-4216-8BAD-FA4C970C3C4E}"/>
-              </a:ext>
-              <a:ext uri="{C183D7F6-B498-43B3-948B-1728B52AA6E4}">
-                <adec:decorative xmlns:adec="http://schemas.microsoft.com/office/drawing/2017/decorative" val="1"/>
-              </a:ext>
-            </a:extLst>
-          </p:cNvPr>
-          <p:cNvCxnSpPr>
-            <a:cxnSpLocks noGrp="1" noRot="1" noChangeAspect="1" noMove="1" noResize="1" noEditPoints="1" noAdjustHandles="1" noChangeArrowheads="1" noChangeShapeType="1"/>
-          </p:cNvCxnSpPr>
-          <p:nvPr>
-            <p:extLst>
-              <p:ext uri="{386F3935-93C4-4BCD-93E2-E3B085C9AB24}">
-                <p16:designElem xmlns:p16="http://schemas.microsoft.com/office/powerpoint/2015/main" val="1"/>
-              </p:ext>
-            </p:extLst>
-          </p:nvPr>
-        </p:nvCxnSpPr>
-        <p:spPr>
-          <a:xfrm>
-            <a:off x="4654296" y="2057400"/>
-            <a:ext cx="0" cy="2743200"/>
-          </a:xfrm>
-          <a:prstGeom prst="line">
+          <a:prstGeom prst="rect">
             <a:avLst/>
           </a:prstGeom>
-          <a:ln w="15875">
-            <a:solidFill>
-              <a:schemeClr val="tx1"/>
-            </a:solidFill>
-          </a:ln>
+          <a:noFill/>
         </p:spPr>
-        <p:style>
-          <a:lnRef idx="1">
-            <a:schemeClr val="accent1"/>
-          </a:lnRef>
-          <a:fillRef idx="0">
-            <a:schemeClr val="accent1"/>
-          </a:fillRef>
-          <a:effectRef idx="0">
-            <a:schemeClr val="accent1"/>
-          </a:effectRef>
-          <a:fontRef idx="minor">
-            <a:schemeClr val="tx1"/>
-          </a:fontRef>
-        </p:style>
-      </p:cxnSp>
-      <p:sp>
-        <p:nvSpPr>
-          <p:cNvPr id="3" name="Content Placeholder 2">
-            <a:extLst>
-              <a:ext uri="{FF2B5EF4-FFF2-40B4-BE49-F238E27FC236}">
-                <a16:creationId xmlns:a16="http://schemas.microsoft.com/office/drawing/2014/main" id="{30539548-507B-B04F-86C9-1F76490A62E8}"/>
-              </a:ext>
-            </a:extLst>
-          </p:cNvPr>
-          <p:cNvSpPr>
-            <a:spLocks noGrp="1"/>
-          </p:cNvSpPr>
-          <p:nvPr>
-            <p:ph idx="1"/>
-          </p:nvPr>
-        </p:nvSpPr>
-        <p:spPr>
-          <a:xfrm>
-            <a:off x="4976031" y="963877"/>
-            <a:ext cx="6377769" cy="4930246"/>
-          </a:xfrm>
-        </p:spPr>
-        <p:txBody>
-          <a:bodyPr anchor="ctr">
-            <a:normAutofit/>
+        <p:txBody>
+          <a:bodyPr wrap="square" rtlCol="0">
+            <a:spAutoFit/>
           </a:bodyPr>
           <a:lstStyle/>
           <a:p>
-            <a:pPr marL="514350" indent="-514350">
-              <a:buFont typeface="+mj-lt"/>
-              <a:buAutoNum type="arabicPeriod"/>
-            </a:pPr>
-            <a:r>
-              <a:rPr lang="en-US" sz="2400" dirty="0"/>
-              <a:t>Distribution of revenue by time</a:t>
-            </a:r>
-          </a:p>
-          <a:p>
-            <a:pPr marL="514350" indent="-514350">
-              <a:buFont typeface="+mj-lt"/>
-              <a:buAutoNum type="arabicPeriod"/>
-            </a:pPr>
-            <a:r>
-              <a:rPr lang="en-US" sz="2400" dirty="0"/>
-              <a:t>Distribution of revenue by country</a:t>
-            </a:r>
+            <a:r>
+              <a:rPr lang="it-IT" i="1" dirty="0" err="1">
+                <a:latin typeface="+mj-lt"/>
+              </a:rPr>
+              <a:t>Revenues</a:t>
+            </a:r>
+            <a:r>
+              <a:rPr lang="it-IT" i="1" dirty="0">
+                <a:latin typeface="+mj-lt"/>
+              </a:rPr>
+              <a:t> are </a:t>
+            </a:r>
+            <a:r>
+              <a:rPr lang="it-IT" i="1" dirty="0" err="1">
+                <a:latin typeface="+mj-lt"/>
+              </a:rPr>
+              <a:t>concentrated</a:t>
+            </a:r>
+            <a:r>
+              <a:rPr lang="it-IT" i="1" dirty="0">
+                <a:latin typeface="+mj-lt"/>
+              </a:rPr>
+              <a:t> </a:t>
+            </a:r>
+            <a:r>
+              <a:rPr lang="it-IT" i="1" dirty="0" err="1">
+                <a:latin typeface="+mj-lt"/>
+              </a:rPr>
+              <a:t>mainly</a:t>
+            </a:r>
+            <a:r>
+              <a:rPr lang="it-IT" i="1" dirty="0">
+                <a:latin typeface="+mj-lt"/>
+              </a:rPr>
+              <a:t> in </a:t>
+            </a:r>
+            <a:r>
+              <a:rPr lang="it-IT" i="1" dirty="0" err="1">
+                <a:latin typeface="+mj-lt"/>
+              </a:rPr>
+              <a:t>one</a:t>
+            </a:r>
+            <a:r>
+              <a:rPr lang="it-IT" i="1" dirty="0">
+                <a:latin typeface="+mj-lt"/>
+              </a:rPr>
+              <a:t> country : UK </a:t>
+            </a:r>
+          </a:p>
+          <a:p>
+            <a:r>
+              <a:rPr lang="it-IT" i="1" dirty="0" err="1">
+                <a:latin typeface="+mj-lt"/>
+              </a:rPr>
+              <a:t>All</a:t>
+            </a:r>
+            <a:r>
+              <a:rPr lang="it-IT" i="1" dirty="0">
+                <a:latin typeface="+mj-lt"/>
+              </a:rPr>
+              <a:t> </a:t>
+            </a:r>
+            <a:r>
+              <a:rPr lang="it-IT" i="1" dirty="0" err="1">
+                <a:latin typeface="+mj-lt"/>
+              </a:rPr>
+              <a:t>other</a:t>
+            </a:r>
+            <a:r>
+              <a:rPr lang="it-IT" i="1" dirty="0">
+                <a:latin typeface="+mj-lt"/>
+              </a:rPr>
+              <a:t> </a:t>
+            </a:r>
+            <a:r>
+              <a:rPr lang="it-IT" i="1" dirty="0" err="1">
+                <a:latin typeface="+mj-lt"/>
+              </a:rPr>
+              <a:t>countries</a:t>
+            </a:r>
+            <a:r>
+              <a:rPr lang="it-IT" i="1" dirty="0">
+                <a:latin typeface="+mj-lt"/>
+              </a:rPr>
+              <a:t> </a:t>
+            </a:r>
+            <a:r>
+              <a:rPr lang="it-IT" i="1" dirty="0" err="1">
+                <a:latin typeface="+mj-lt"/>
+              </a:rPr>
+              <a:t>have</a:t>
+            </a:r>
+            <a:r>
+              <a:rPr lang="it-IT" i="1" dirty="0">
+                <a:latin typeface="+mj-lt"/>
+              </a:rPr>
+              <a:t> a </a:t>
+            </a:r>
+            <a:r>
+              <a:rPr lang="it-IT" i="1" dirty="0" err="1">
+                <a:latin typeface="+mj-lt"/>
+              </a:rPr>
+              <a:t>revenue</a:t>
+            </a:r>
+            <a:r>
+              <a:rPr lang="it-IT" i="1" dirty="0">
+                <a:latin typeface="+mj-lt"/>
+              </a:rPr>
+              <a:t> </a:t>
+            </a:r>
+            <a:r>
+              <a:rPr lang="it-IT" i="1" dirty="0" err="1">
+                <a:latin typeface="+mj-lt"/>
+              </a:rPr>
+              <a:t>that</a:t>
+            </a:r>
+            <a:r>
+              <a:rPr lang="it-IT" i="1" dirty="0">
+                <a:latin typeface="+mj-lt"/>
+              </a:rPr>
+              <a:t> </a:t>
+            </a:r>
+            <a:r>
+              <a:rPr lang="it-IT" i="1" dirty="0" err="1">
+                <a:latin typeface="+mj-lt"/>
+              </a:rPr>
+              <a:t>is</a:t>
+            </a:r>
+            <a:r>
+              <a:rPr lang="it-IT" i="1" dirty="0">
+                <a:latin typeface="+mj-lt"/>
+              </a:rPr>
+              <a:t> </a:t>
+            </a:r>
+            <a:r>
+              <a:rPr lang="it-IT" i="1" dirty="0" err="1">
+                <a:latin typeface="+mj-lt"/>
+              </a:rPr>
+              <a:t>relatively</a:t>
+            </a:r>
+            <a:r>
+              <a:rPr lang="it-IT" i="1" dirty="0">
+                <a:latin typeface="+mj-lt"/>
+              </a:rPr>
+              <a:t> </a:t>
+            </a:r>
+            <a:r>
+              <a:rPr lang="it-IT" i="1" dirty="0" err="1">
+                <a:latin typeface="+mj-lt"/>
+              </a:rPr>
+              <a:t>balanced</a:t>
+            </a:r>
+            <a:endParaRPr lang="it-IT" i="1" dirty="0">
+              <a:latin typeface="+mj-lt"/>
+            </a:endParaRPr>
           </a:p>
         </p:txBody>
       </p:sp>
     </p:spTree>
     <p:extLst>
       <p:ext uri="{BB962C8B-B14F-4D97-AF65-F5344CB8AC3E}">
-        <p14:creationId xmlns:p14="http://schemas.microsoft.com/office/powerpoint/2010/main" val="1046019218"/>
+        <p14:creationId xmlns:p14="http://schemas.microsoft.com/office/powerpoint/2010/main" val="3231739818"/>
       </p:ext>
     </p:extLst>
   </p:cSld>
   <p:clrMapOvr>
-    <a:overrideClrMapping bg1="dk1" tx1="lt1" bg2="dk2" tx2="lt2" accent1="accent1" accent2="accent2" accent3="accent3" accent4="accent4" accent5="accent5" accent6="accent6" hlink="hlink" folHlink="folHlink"/>
+    <a:masterClrMapping/>
   </p:clrMapOvr>
 </p:sld>
 </file>
@@ -3823,260 +3701,47 @@
       </p:grpSpPr>
       <p:sp>
         <p:nvSpPr>
-          <p:cNvPr id="2" name="Title 1">
-            <a:extLst>
-              <a:ext uri="{FF2B5EF4-FFF2-40B4-BE49-F238E27FC236}">
-                <a16:creationId xmlns:a16="http://schemas.microsoft.com/office/drawing/2014/main" id="{C2332C11-B0EE-024F-B9F3-A40F792D7752}"/>
-              </a:ext>
-            </a:extLst>
-          </p:cNvPr>
-          <p:cNvSpPr>
-            <a:spLocks noGrp="1"/>
-          </p:cNvSpPr>
-          <p:nvPr>
-            <p:ph type="title"/>
-          </p:nvPr>
-        </p:nvSpPr>
-        <p:spPr/>
-        <p:txBody>
-          <a:bodyPr/>
-          <a:lstStyle/>
-          <a:p>
-            <a:endParaRPr lang="en-US"/>
-          </a:p>
-        </p:txBody>
-      </p:sp>
-    </p:spTree>
-    <p:extLst>
-      <p:ext uri="{BB962C8B-B14F-4D97-AF65-F5344CB8AC3E}">
-        <p14:creationId xmlns:p14="http://schemas.microsoft.com/office/powerpoint/2010/main" val="1669671718"/>
-      </p:ext>
-    </p:extLst>
-  </p:cSld>
-  <p:clrMapOvr>
-    <a:masterClrMapping/>
-  </p:clrMapOvr>
-</p:sld>
-</file>
-
-<file path=ppt/slides/slide4.xml><?xml version="1.0" encoding="utf-8"?>
-<p:sld xmlns:a="http://schemas.openxmlformats.org/drawingml/2006/main" xmlns:r="http://schemas.openxmlformats.org/officeDocument/2006/relationships" xmlns:p="http://schemas.openxmlformats.org/presentationml/2006/main">
-  <p:cSld>
-    <p:bg>
-      <p:bgPr>
-        <a:solidFill>
-          <a:schemeClr val="bg1"/>
-        </a:solidFill>
-        <a:effectLst/>
-      </p:bgPr>
-    </p:bg>
-    <p:spTree>
-      <p:nvGrpSpPr>
-        <p:cNvPr id="1" name=""/>
-        <p:cNvGrpSpPr/>
-        <p:nvPr/>
-      </p:nvGrpSpPr>
-      <p:grpSpPr>
-        <a:xfrm>
-          <a:off x="0" y="0"/>
-          <a:ext cx="0" cy="0"/>
-          <a:chOff x="0" y="0"/>
-          <a:chExt cx="0" cy="0"/>
-        </a:xfrm>
-      </p:grpSpPr>
-      <p:sp>
-        <p:nvSpPr>
-          <p:cNvPr id="8" name="Rectangle 7">
-            <a:extLst>
-              <a:ext uri="{FF2B5EF4-FFF2-40B4-BE49-F238E27FC236}">
-                <a16:creationId xmlns:a16="http://schemas.microsoft.com/office/drawing/2014/main" id="{02D886F1-CB4A-4FC1-AAA7-9402B0D0DDDD}"/>
-              </a:ext>
-              <a:ext uri="{C183D7F6-B498-43B3-948B-1728B52AA6E4}">
-                <adec:decorative xmlns:adec="http://schemas.microsoft.com/office/drawing/2017/decorative" val="1"/>
-              </a:ext>
-            </a:extLst>
-          </p:cNvPr>
-          <p:cNvSpPr>
-            <a:spLocks noGrp="1" noRot="1" noChangeAspect="1" noMove="1" noResize="1" noEditPoints="1" noAdjustHandles="1" noChangeArrowheads="1" noChangeShapeType="1" noTextEdit="1"/>
-          </p:cNvSpPr>
-          <p:nvPr>
-            <p:extLst>
-              <p:ext uri="{386F3935-93C4-4BCD-93E2-E3B085C9AB24}">
-                <p16:designElem xmlns:p16="http://schemas.microsoft.com/office/powerpoint/2015/main" val="1"/>
-              </p:ext>
-            </p:extLst>
-          </p:nvPr>
+          <p:cNvPr id="4" name="TextBox 3">
+            <a:extLst>
+              <a:ext uri="{FF2B5EF4-FFF2-40B4-BE49-F238E27FC236}">
+                <a16:creationId xmlns:a16="http://schemas.microsoft.com/office/drawing/2014/main" id="{CB45B4F1-48F7-5B44-ABB2-944B10BF6CB7}"/>
+              </a:ext>
+            </a:extLst>
+          </p:cNvPr>
+          <p:cNvSpPr txBox="1"/>
+          <p:nvPr/>
         </p:nvSpPr>
         <p:spPr>
           <a:xfrm>
-            <a:off x="0" y="0"/>
-            <a:ext cx="2013557" cy="6858000"/>
+            <a:off x="444843" y="308919"/>
+            <a:ext cx="3768811" cy="2585323"/>
           </a:xfrm>
           <a:prstGeom prst="rect">
             <a:avLst/>
           </a:prstGeom>
-          <a:solidFill>
-            <a:srgbClr val="7F7F7F"/>
-          </a:solidFill>
-          <a:ln>
-            <a:noFill/>
-          </a:ln>
+          <a:noFill/>
         </p:spPr>
-        <p:style>
-          <a:lnRef idx="2">
-            <a:schemeClr val="accent1">
-              <a:shade val="50000"/>
-            </a:schemeClr>
-          </a:lnRef>
-          <a:fillRef idx="1">
-            <a:schemeClr val="accent1"/>
-          </a:fillRef>
-          <a:effectRef idx="0">
-            <a:schemeClr val="accent1"/>
-          </a:effectRef>
-          <a:fontRef idx="minor">
-            <a:schemeClr val="lt1"/>
-          </a:fontRef>
-        </p:style>
-        <p:txBody>
-          <a:bodyPr rtlCol="0" anchor="ctr"/>
-          <a:lstStyle/>
-          <a:p>
-            <a:pPr marL="0" marR="0" lvl="0" indent="0" algn="ctr" defTabSz="914400" rtl="0" eaLnBrk="1" fontAlgn="auto" latinLnBrk="0" hangingPunct="1">
-              <a:lnSpc>
-                <a:spcPct val="100000"/>
-              </a:lnSpc>
-              <a:spcBef>
-                <a:spcPts val="0"/>
-              </a:spcBef>
-              <a:spcAft>
-                <a:spcPts val="0"/>
-              </a:spcAft>
-              <a:buClrTx/>
-              <a:buSzTx/>
-              <a:buFontTx/>
-              <a:buNone/>
-              <a:tabLst/>
-              <a:defRPr/>
-            </a:pPr>
-            <a:endParaRPr kumimoji="0" lang="en-US" sz="1800" b="0" i="0" u="none" strike="noStrike" kern="1200" cap="none" spc="0" normalizeH="0" baseline="0" noProof="0">
-              <a:ln>
-                <a:noFill/>
-              </a:ln>
-              <a:solidFill>
-                <a:prstClr val="white"/>
-              </a:solidFill>
-              <a:effectLst/>
-              <a:uLnTx/>
-              <a:uFillTx/>
-              <a:latin typeface="Calibri" panose="020F0502020204030204"/>
-              <a:ea typeface="+mn-ea"/>
-              <a:cs typeface="+mn-cs"/>
-            </a:endParaRPr>
-          </a:p>
-        </p:txBody>
-      </p:sp>
-      <p:sp>
-        <p:nvSpPr>
-          <p:cNvPr id="10" name="Rectangle 9">
-            <a:extLst>
-              <a:ext uri="{FF2B5EF4-FFF2-40B4-BE49-F238E27FC236}">
-                <a16:creationId xmlns:a16="http://schemas.microsoft.com/office/drawing/2014/main" id="{762B7B97-C3EE-4AEE-A61F-AFA873FE2FCA}"/>
-              </a:ext>
-              <a:ext uri="{C183D7F6-B498-43B3-948B-1728B52AA6E4}">
-                <adec:decorative xmlns:adec="http://schemas.microsoft.com/office/drawing/2017/decorative" val="1"/>
-              </a:ext>
-            </a:extLst>
-          </p:cNvPr>
-          <p:cNvSpPr>
-            <a:spLocks noGrp="1" noRot="1" noChangeAspect="1" noMove="1" noResize="1" noEditPoints="1" noAdjustHandles="1" noChangeArrowheads="1" noChangeShapeType="1" noTextEdit="1"/>
-          </p:cNvSpPr>
-          <p:nvPr>
-            <p:extLst>
-              <p:ext uri="{386F3935-93C4-4BCD-93E2-E3B085C9AB24}">
-                <p16:designElem xmlns:p16="http://schemas.microsoft.com/office/powerpoint/2015/main" val="1"/>
-              </p:ext>
-            </p:extLst>
-          </p:nvPr>
-        </p:nvSpPr>
-        <p:spPr>
-          <a:xfrm flipH="1">
-            <a:off x="2013557" y="0"/>
-            <a:ext cx="10178443" cy="6858000"/>
-          </a:xfrm>
-          <a:prstGeom prst="rect">
-            <a:avLst/>
-          </a:prstGeom>
-          <a:solidFill>
-            <a:schemeClr val="tx1">
-              <a:lumMod val="75000"/>
-              <a:lumOff val="25000"/>
-            </a:schemeClr>
-          </a:solidFill>
-          <a:ln>
-            <a:noFill/>
-          </a:ln>
-        </p:spPr>
-        <p:style>
-          <a:lnRef idx="2">
-            <a:schemeClr val="accent1">
-              <a:shade val="50000"/>
-            </a:schemeClr>
-          </a:lnRef>
-          <a:fillRef idx="1">
-            <a:schemeClr val="accent1"/>
-          </a:fillRef>
-          <a:effectRef idx="0">
-            <a:schemeClr val="accent1"/>
-          </a:effectRef>
-          <a:fontRef idx="minor">
-            <a:schemeClr val="lt1"/>
-          </a:fontRef>
-        </p:style>
-        <p:txBody>
-          <a:bodyPr rtlCol="0" anchor="ctr"/>
-          <a:lstStyle/>
-          <a:p>
-            <a:pPr marL="0" marR="0" lvl="0" indent="0" algn="ctr" defTabSz="914400" rtl="0" eaLnBrk="1" fontAlgn="auto" latinLnBrk="0" hangingPunct="1">
-              <a:lnSpc>
-                <a:spcPct val="100000"/>
-              </a:lnSpc>
-              <a:spcBef>
-                <a:spcPts val="0"/>
-              </a:spcBef>
-              <a:spcAft>
-                <a:spcPts val="0"/>
-              </a:spcAft>
-              <a:buClrTx/>
-              <a:buSzTx/>
-              <a:buFontTx/>
-              <a:buNone/>
-              <a:tabLst/>
-              <a:defRPr/>
-            </a:pPr>
-            <a:endParaRPr kumimoji="0" lang="en-US" sz="1800" b="0" i="0" u="none" strike="noStrike" kern="1200" cap="none" spc="0" normalizeH="0" baseline="0" noProof="0">
-              <a:ln>
-                <a:noFill/>
-              </a:ln>
-              <a:solidFill>
-                <a:prstClr val="white"/>
-              </a:solidFill>
-              <a:effectLst/>
-              <a:uLnTx/>
-              <a:uFillTx/>
-              <a:latin typeface="Calibri" panose="020F0502020204030204"/>
-              <a:ea typeface="+mn-ea"/>
-              <a:cs typeface="+mn-cs"/>
-            </a:endParaRPr>
+        <p:txBody>
+          <a:bodyPr wrap="square" rtlCol="0">
+            <a:spAutoFit/>
+          </a:bodyPr>
+          <a:lstStyle/>
+          <a:p>
+            <a:r>
+              <a:rPr lang="en-US" i="1" dirty="0">
+                <a:latin typeface="+mj-lt"/>
+              </a:rPr>
+              <a:t>It is not sure if revenue has some kind of seasonality. We can see a major peak on 2018 November but we have not enough data to confirm this. On 2017 November and December such peak is not present. This could be due to the fact that the business was ramping up at the time but revenue has not growth much since then</a:t>
+            </a:r>
           </a:p>
         </p:txBody>
       </p:sp>
       <p:pic>
         <p:nvPicPr>
-          <p:cNvPr id="7" name="Picture 6" descr="Chart, histogram&#10;&#10;Description automatically generated">
-            <a:extLst>
-              <a:ext uri="{FF2B5EF4-FFF2-40B4-BE49-F238E27FC236}">
-                <a16:creationId xmlns:a16="http://schemas.microsoft.com/office/drawing/2014/main" id="{90550D00-C892-6A49-B45D-D8249446986E}"/>
+          <p:cNvPr id="5" name="Picture 4" descr="Chart, histogram&#10;&#10;Description automatically generated">
+            <a:extLst>
+              <a:ext uri="{FF2B5EF4-FFF2-40B4-BE49-F238E27FC236}">
+                <a16:creationId xmlns:a16="http://schemas.microsoft.com/office/drawing/2014/main" id="{1E0D4F4C-191D-5940-AC9A-203711566A4C}"/>
               </a:ext>
             </a:extLst>
           </p:cNvPr>
@@ -4093,55 +3758,18 @@
         </p:blipFill>
         <p:spPr>
           <a:xfrm>
-            <a:off x="3314701" y="1133475"/>
-            <a:ext cx="8039100" cy="5359400"/>
+            <a:off x="4028303" y="1490363"/>
+            <a:ext cx="8051457" cy="5367638"/>
           </a:xfrm>
           <a:prstGeom prst="rect">
             <a:avLst/>
           </a:prstGeom>
         </p:spPr>
       </p:pic>
-      <p:sp>
-        <p:nvSpPr>
-          <p:cNvPr id="13" name="Title 12">
-            <a:extLst>
-              <a:ext uri="{FF2B5EF4-FFF2-40B4-BE49-F238E27FC236}">
-                <a16:creationId xmlns:a16="http://schemas.microsoft.com/office/drawing/2014/main" id="{59FFA251-DB75-8747-A8C2-8A4E7CABBBA3}"/>
-              </a:ext>
-            </a:extLst>
-          </p:cNvPr>
-          <p:cNvSpPr>
-            <a:spLocks noGrp="1"/>
-          </p:cNvSpPr>
-          <p:nvPr>
-            <p:ph type="title"/>
-          </p:nvPr>
-        </p:nvSpPr>
-        <p:spPr>
-          <a:xfrm>
-            <a:off x="838200" y="365125"/>
-            <a:ext cx="10515600" cy="777875"/>
-          </a:xfrm>
-        </p:spPr>
-        <p:txBody>
-          <a:bodyPr/>
-          <a:lstStyle/>
-          <a:p>
-            <a:r>
-              <a:rPr lang="en-US" dirty="0">
-                <a:solidFill>
-                  <a:schemeClr val="bg1"/>
-                </a:solidFill>
-              </a:rPr>
-              <a:t>Views By Country</a:t>
-            </a:r>
-          </a:p>
-        </p:txBody>
-      </p:sp>
     </p:spTree>
     <p:extLst>
       <p:ext uri="{BB962C8B-B14F-4D97-AF65-F5344CB8AC3E}">
-        <p14:creationId xmlns:p14="http://schemas.microsoft.com/office/powerpoint/2010/main" val="3818371078"/>
+        <p14:creationId xmlns:p14="http://schemas.microsoft.com/office/powerpoint/2010/main" val="3258260056"/>
       </p:ext>
     </p:extLst>
   </p:cSld>
@@ -4151,308 +3779,7 @@
 </p:sld>
 </file>
 
-<file path=ppt/slides/slide5.xml><?xml version="1.0" encoding="utf-8"?>
-<p:sld xmlns:a="http://schemas.openxmlformats.org/drawingml/2006/main" xmlns:r="http://schemas.openxmlformats.org/officeDocument/2006/relationships" xmlns:p="http://schemas.openxmlformats.org/presentationml/2006/main">
-  <p:cSld>
-    <p:bg>
-      <p:bgPr>
-        <a:solidFill>
-          <a:schemeClr val="bg1"/>
-        </a:solidFill>
-        <a:effectLst/>
-      </p:bgPr>
-    </p:bg>
-    <p:spTree>
-      <p:nvGrpSpPr>
-        <p:cNvPr id="1" name=""/>
-        <p:cNvGrpSpPr/>
-        <p:nvPr/>
-      </p:nvGrpSpPr>
-      <p:grpSpPr>
-        <a:xfrm>
-          <a:off x="0" y="0"/>
-          <a:ext cx="0" cy="0"/>
-          <a:chOff x="0" y="0"/>
-          <a:chExt cx="0" cy="0"/>
-        </a:xfrm>
-      </p:grpSpPr>
-      <p:sp>
-        <p:nvSpPr>
-          <p:cNvPr id="8" name="Rectangle 7">
-            <a:extLst>
-              <a:ext uri="{FF2B5EF4-FFF2-40B4-BE49-F238E27FC236}">
-                <a16:creationId xmlns:a16="http://schemas.microsoft.com/office/drawing/2014/main" id="{02D886F1-CB4A-4FC1-AAA7-9402B0D0DDDD}"/>
-              </a:ext>
-              <a:ext uri="{C183D7F6-B498-43B3-948B-1728B52AA6E4}">
-                <adec:decorative xmlns:adec="http://schemas.microsoft.com/office/drawing/2017/decorative" val="1"/>
-              </a:ext>
-            </a:extLst>
-          </p:cNvPr>
-          <p:cNvSpPr>
-            <a:spLocks noGrp="1" noRot="1" noChangeAspect="1" noMove="1" noResize="1" noEditPoints="1" noAdjustHandles="1" noChangeArrowheads="1" noChangeShapeType="1" noTextEdit="1"/>
-          </p:cNvSpPr>
-          <p:nvPr>
-            <p:extLst>
-              <p:ext uri="{386F3935-93C4-4BCD-93E2-E3B085C9AB24}">
-                <p16:designElem xmlns:p16="http://schemas.microsoft.com/office/powerpoint/2015/main" val="1"/>
-              </p:ext>
-            </p:extLst>
-          </p:nvPr>
-        </p:nvSpPr>
-        <p:spPr>
-          <a:xfrm>
-            <a:off x="0" y="0"/>
-            <a:ext cx="2013557" cy="6858000"/>
-          </a:xfrm>
-          <a:prstGeom prst="rect">
-            <a:avLst/>
-          </a:prstGeom>
-          <a:solidFill>
-            <a:srgbClr val="7F7F7F"/>
-          </a:solidFill>
-          <a:ln>
-            <a:noFill/>
-          </a:ln>
-        </p:spPr>
-        <p:style>
-          <a:lnRef idx="2">
-            <a:schemeClr val="accent1">
-              <a:shade val="50000"/>
-            </a:schemeClr>
-          </a:lnRef>
-          <a:fillRef idx="1">
-            <a:schemeClr val="accent1"/>
-          </a:fillRef>
-          <a:effectRef idx="0">
-            <a:schemeClr val="accent1"/>
-          </a:effectRef>
-          <a:fontRef idx="minor">
-            <a:schemeClr val="lt1"/>
-          </a:fontRef>
-        </p:style>
-        <p:txBody>
-          <a:bodyPr rtlCol="0" anchor="ctr"/>
-          <a:lstStyle/>
-          <a:p>
-            <a:pPr marL="0" marR="0" lvl="0" indent="0" algn="ctr" defTabSz="914400" rtl="0" eaLnBrk="1" fontAlgn="auto" latinLnBrk="0" hangingPunct="1">
-              <a:lnSpc>
-                <a:spcPct val="100000"/>
-              </a:lnSpc>
-              <a:spcBef>
-                <a:spcPts val="0"/>
-              </a:spcBef>
-              <a:spcAft>
-                <a:spcPts val="0"/>
-              </a:spcAft>
-              <a:buClrTx/>
-              <a:buSzTx/>
-              <a:buFontTx/>
-              <a:buNone/>
-              <a:tabLst/>
-              <a:defRPr/>
-            </a:pPr>
-            <a:endParaRPr kumimoji="0" lang="en-US" sz="1800" b="0" i="0" u="none" strike="noStrike" kern="1200" cap="none" spc="0" normalizeH="0" baseline="0" noProof="0">
-              <a:ln>
-                <a:noFill/>
-              </a:ln>
-              <a:solidFill>
-                <a:prstClr val="white"/>
-              </a:solidFill>
-              <a:effectLst/>
-              <a:uLnTx/>
-              <a:uFillTx/>
-              <a:latin typeface="Calibri" panose="020F0502020204030204"/>
-              <a:ea typeface="+mn-ea"/>
-              <a:cs typeface="+mn-cs"/>
-            </a:endParaRPr>
-          </a:p>
-        </p:txBody>
-      </p:sp>
-      <p:sp>
-        <p:nvSpPr>
-          <p:cNvPr id="10" name="Rectangle 9">
-            <a:extLst>
-              <a:ext uri="{FF2B5EF4-FFF2-40B4-BE49-F238E27FC236}">
-                <a16:creationId xmlns:a16="http://schemas.microsoft.com/office/drawing/2014/main" id="{762B7B97-C3EE-4AEE-A61F-AFA873FE2FCA}"/>
-              </a:ext>
-              <a:ext uri="{C183D7F6-B498-43B3-948B-1728B52AA6E4}">
-                <adec:decorative xmlns:adec="http://schemas.microsoft.com/office/drawing/2017/decorative" val="1"/>
-              </a:ext>
-            </a:extLst>
-          </p:cNvPr>
-          <p:cNvSpPr>
-            <a:spLocks noGrp="1" noRot="1" noChangeAspect="1" noMove="1" noResize="1" noEditPoints="1" noAdjustHandles="1" noChangeArrowheads="1" noChangeShapeType="1" noTextEdit="1"/>
-          </p:cNvSpPr>
-          <p:nvPr>
-            <p:extLst>
-              <p:ext uri="{386F3935-93C4-4BCD-93E2-E3B085C9AB24}">
-                <p16:designElem xmlns:p16="http://schemas.microsoft.com/office/powerpoint/2015/main" val="1"/>
-              </p:ext>
-            </p:extLst>
-          </p:nvPr>
-        </p:nvSpPr>
-        <p:spPr>
-          <a:xfrm flipH="1">
-            <a:off x="2013557" y="0"/>
-            <a:ext cx="10178443" cy="6858000"/>
-          </a:xfrm>
-          <a:prstGeom prst="rect">
-            <a:avLst/>
-          </a:prstGeom>
-          <a:solidFill>
-            <a:schemeClr val="tx1">
-              <a:lumMod val="75000"/>
-              <a:lumOff val="25000"/>
-            </a:schemeClr>
-          </a:solidFill>
-          <a:ln>
-            <a:noFill/>
-          </a:ln>
-        </p:spPr>
-        <p:style>
-          <a:lnRef idx="2">
-            <a:schemeClr val="accent1">
-              <a:shade val="50000"/>
-            </a:schemeClr>
-          </a:lnRef>
-          <a:fillRef idx="1">
-            <a:schemeClr val="accent1"/>
-          </a:fillRef>
-          <a:effectRef idx="0">
-            <a:schemeClr val="accent1"/>
-          </a:effectRef>
-          <a:fontRef idx="minor">
-            <a:schemeClr val="lt1"/>
-          </a:fontRef>
-        </p:style>
-        <p:txBody>
-          <a:bodyPr rtlCol="0" anchor="ctr"/>
-          <a:lstStyle/>
-          <a:p>
-            <a:pPr marL="0" marR="0" lvl="0" indent="0" algn="ctr" defTabSz="914400" rtl="0" eaLnBrk="1" fontAlgn="auto" latinLnBrk="0" hangingPunct="1">
-              <a:lnSpc>
-                <a:spcPct val="100000"/>
-              </a:lnSpc>
-              <a:spcBef>
-                <a:spcPts val="0"/>
-              </a:spcBef>
-              <a:spcAft>
-                <a:spcPts val="0"/>
-              </a:spcAft>
-              <a:buClrTx/>
-              <a:buSzTx/>
-              <a:buFontTx/>
-              <a:buNone/>
-              <a:tabLst/>
-              <a:defRPr/>
-            </a:pPr>
-            <a:endParaRPr kumimoji="0" lang="en-US" sz="1800" b="0" i="0" u="none" strike="noStrike" kern="1200" cap="none" spc="0" normalizeH="0" baseline="0" noProof="0">
-              <a:ln>
-                <a:noFill/>
-              </a:ln>
-              <a:solidFill>
-                <a:prstClr val="white"/>
-              </a:solidFill>
-              <a:effectLst/>
-              <a:uLnTx/>
-              <a:uFillTx/>
-              <a:latin typeface="Calibri" panose="020F0502020204030204"/>
-              <a:ea typeface="+mn-ea"/>
-              <a:cs typeface="+mn-cs"/>
-            </a:endParaRPr>
-          </a:p>
-        </p:txBody>
-      </p:sp>
-      <p:sp>
-        <p:nvSpPr>
-          <p:cNvPr id="2" name="Title 1">
-            <a:extLst>
-              <a:ext uri="{FF2B5EF4-FFF2-40B4-BE49-F238E27FC236}">
-                <a16:creationId xmlns:a16="http://schemas.microsoft.com/office/drawing/2014/main" id="{E88D52F5-59A9-B343-8B83-A60F28C1B43E}"/>
-              </a:ext>
-            </a:extLst>
-          </p:cNvPr>
-          <p:cNvSpPr>
-            <a:spLocks noGrp="1"/>
-          </p:cNvSpPr>
-          <p:nvPr>
-            <p:ph type="title"/>
-          </p:nvPr>
-        </p:nvSpPr>
-        <p:spPr>
-          <a:xfrm>
-            <a:off x="623787" y="1635358"/>
-            <a:ext cx="2752344" cy="2706624"/>
-          </a:xfrm>
-          <a:prstGeom prst="ellipse">
-            <a:avLst/>
-          </a:prstGeom>
-          <a:solidFill>
-            <a:schemeClr val="bg1"/>
-          </a:solidFill>
-          <a:ln w="174625" cmpd="thinThick">
-            <a:solidFill>
-              <a:schemeClr val="bg1"/>
-            </a:solidFill>
-          </a:ln>
-        </p:spPr>
-        <p:txBody>
-          <a:bodyPr>
-            <a:normAutofit/>
-          </a:bodyPr>
-          <a:lstStyle/>
-          <a:p>
-            <a:pPr algn="ctr"/>
-            <a:r>
-              <a:rPr lang="en-US" sz="2600" dirty="0"/>
-              <a:t>Revenue by Month</a:t>
-            </a:r>
-          </a:p>
-        </p:txBody>
-      </p:sp>
-      <p:pic>
-        <p:nvPicPr>
-          <p:cNvPr id="5" name="Content Placeholder 4" descr="Chart, histogram&#10;&#10;Description automatically generated">
-            <a:extLst>
-              <a:ext uri="{FF2B5EF4-FFF2-40B4-BE49-F238E27FC236}">
-                <a16:creationId xmlns:a16="http://schemas.microsoft.com/office/drawing/2014/main" id="{C0D89A0B-045C-B44D-9204-EFF476801DB2}"/>
-              </a:ext>
-            </a:extLst>
-          </p:cNvPr>
-          <p:cNvPicPr>
-            <a:picLocks noGrp="1" noChangeAspect="1"/>
-          </p:cNvPicPr>
-          <p:nvPr>
-            <p:ph idx="1"/>
-          </p:nvPr>
-        </p:nvPicPr>
-        <p:blipFill>
-          <a:blip r:embed="rId2"/>
-          <a:stretch>
-            <a:fillRect/>
-          </a:stretch>
-        </p:blipFill>
-        <p:spPr>
-          <a:xfrm>
-            <a:off x="4494610" y="1087438"/>
-            <a:ext cx="5703093" cy="3802062"/>
-          </a:xfrm>
-        </p:spPr>
-      </p:pic>
-    </p:spTree>
-    <p:extLst>
-      <p:ext uri="{BB962C8B-B14F-4D97-AF65-F5344CB8AC3E}">
-        <p14:creationId xmlns:p14="http://schemas.microsoft.com/office/powerpoint/2010/main" val="776464750"/>
-      </p:ext>
-    </p:extLst>
-  </p:cSld>
-  <p:clrMapOvr>
-    <a:masterClrMapping/>
-  </p:clrMapOvr>
-</p:sld>
-</file>
-
-<file path=ppt/slides/slide6.xml><?xml version="1.0" encoding="utf-8"?>
+<file path=ppt/slides/slide4.xml><?xml version="1.0" encoding="utf-8"?>
 <p:sld xmlns:a="http://schemas.openxmlformats.org/drawingml/2006/main" xmlns:r="http://schemas.openxmlformats.org/officeDocument/2006/relationships" xmlns:p="http://schemas.openxmlformats.org/presentationml/2006/main">
   <p:cSld>
     <p:spTree>
@@ -4469,10 +3796,47 @@
           <a:chExt cx="0" cy="0"/>
         </a:xfrm>
       </p:grpSpPr>
+      <p:sp>
+        <p:nvSpPr>
+          <p:cNvPr id="2" name="TextBox 1">
+            <a:extLst>
+              <a:ext uri="{FF2B5EF4-FFF2-40B4-BE49-F238E27FC236}">
+                <a16:creationId xmlns:a16="http://schemas.microsoft.com/office/drawing/2014/main" id="{AC31AD30-9A67-6C46-956E-8DA2CD8B8524}"/>
+              </a:ext>
+            </a:extLst>
+          </p:cNvPr>
+          <p:cNvSpPr txBox="1"/>
+          <p:nvPr/>
+        </p:nvSpPr>
+        <p:spPr>
+          <a:xfrm>
+            <a:off x="444843" y="308919"/>
+            <a:ext cx="10969391" cy="646331"/>
+          </a:xfrm>
+          <a:prstGeom prst="rect">
+            <a:avLst/>
+          </a:prstGeom>
+          <a:noFill/>
+        </p:spPr>
+        <p:txBody>
+          <a:bodyPr wrap="square" rtlCol="0">
+            <a:spAutoFit/>
+          </a:bodyPr>
+          <a:lstStyle/>
+          <a:p>
+            <a:r>
+              <a:rPr lang="en-US" i="1" dirty="0">
+                <a:latin typeface="+mj-lt"/>
+              </a:rPr>
+              <a:t>The conclusion is that the revenue seems to have a regular distribution among time. It is also regularly distributed among countries (except for UK).</a:t>
+            </a:r>
+          </a:p>
+        </p:txBody>
+      </p:sp>
     </p:spTree>
     <p:extLst>
       <p:ext uri="{BB962C8B-B14F-4D97-AF65-F5344CB8AC3E}">
-        <p14:creationId xmlns:p14="http://schemas.microsoft.com/office/powerpoint/2010/main" val="4232976742"/>
+        <p14:creationId xmlns:p14="http://schemas.microsoft.com/office/powerpoint/2010/main" val="966316778"/>
       </p:ext>
     </p:extLst>
   </p:cSld>

</xml_diff>